<commit_message>
Update Embedded Network Design.pptx
</commit_message>
<xml_diff>
--- a/Embedded/Embedded Network Design.pptx
+++ b/Embedded/Embedded Network Design.pptx
@@ -168,7 +168,7 @@
           <a:noFill/>
           <a:extLst>
             <a:ext uri="{909E8E84-426E-40dd-AFC4-6F175D3DCCD1}">
-              <a14:hiddenFill xmlns="" xmlns:a14="http://schemas.microsoft.com/office/drawing/2010/main">
+              <a14:hiddenFill xmlns:a14="http://schemas.microsoft.com/office/drawing/2010/main" xmlns="">
                 <a:solidFill>
                   <a:srgbClr val="FFFFFF"/>
                 </a:solidFill>
@@ -228,7 +228,7 @@
             </a:ln>
             <a:extLst>
               <a:ext uri="{91240B29-F687-4f45-9708-019B960494DF}">
-                <a14:hiddenLine xmlns="" xmlns:a14="http://schemas.microsoft.com/office/drawing/2010/main" w="9525">
+                <a14:hiddenLine xmlns:a14="http://schemas.microsoft.com/office/drawing/2010/main" xmlns="" w="9525">
                   <a:solidFill>
                     <a:srgbClr val="000000"/>
                   </a:solidFill>
@@ -318,7 +318,7 @@
             </a:ln>
             <a:extLst>
               <a:ext uri="{91240B29-F687-4f45-9708-019B960494DF}">
-                <a14:hiddenLine xmlns="" xmlns:a14="http://schemas.microsoft.com/office/drawing/2010/main" w="9525">
+                <a14:hiddenLine xmlns:a14="http://schemas.microsoft.com/office/drawing/2010/main" xmlns="" w="9525">
                   <a:solidFill>
                     <a:srgbClr val="000000"/>
                   </a:solidFill>
@@ -408,7 +408,7 @@
             </a:ln>
             <a:extLst>
               <a:ext uri="{91240B29-F687-4f45-9708-019B960494DF}">
-                <a14:hiddenLine xmlns="" xmlns:a14="http://schemas.microsoft.com/office/drawing/2010/main" w="9525">
+                <a14:hiddenLine xmlns:a14="http://schemas.microsoft.com/office/drawing/2010/main" xmlns="" w="9525">
                   <a:solidFill>
                     <a:srgbClr val="000000"/>
                   </a:solidFill>
@@ -442,7 +442,7 @@
             </a:ln>
             <a:extLst>
               <a:ext uri="{91240B29-F687-4f45-9708-019B960494DF}">
-                <a14:hiddenLine xmlns="" xmlns:a14="http://schemas.microsoft.com/office/drawing/2010/main" w="9525">
+                <a14:hiddenLine xmlns:a14="http://schemas.microsoft.com/office/drawing/2010/main" xmlns="" w="9525">
                   <a:solidFill>
                     <a:srgbClr val="000000"/>
                   </a:solidFill>
@@ -532,7 +532,7 @@
             </a:ln>
             <a:extLst>
               <a:ext uri="{91240B29-F687-4f45-9708-019B960494DF}">
-                <a14:hiddenLine xmlns="" xmlns:a14="http://schemas.microsoft.com/office/drawing/2010/main" w="9525">
+                <a14:hiddenLine xmlns:a14="http://schemas.microsoft.com/office/drawing/2010/main" xmlns="" w="9525">
                   <a:solidFill>
                     <a:srgbClr val="000000"/>
                   </a:solidFill>
@@ -594,7 +594,7 @@
             </a:ln>
             <a:extLst>
               <a:ext uri="{91240B29-F687-4f45-9708-019B960494DF}">
-                <a14:hiddenLine xmlns="" xmlns:a14="http://schemas.microsoft.com/office/drawing/2010/main" w="9525">
+                <a14:hiddenLine xmlns:a14="http://schemas.microsoft.com/office/drawing/2010/main" xmlns="" w="9525">
                   <a:solidFill>
                     <a:srgbClr val="000000"/>
                   </a:solidFill>
@@ -656,7 +656,7 @@
             </a:ln>
             <a:extLst>
               <a:ext uri="{91240B29-F687-4f45-9708-019B960494DF}">
-                <a14:hiddenLine xmlns="" xmlns:a14="http://schemas.microsoft.com/office/drawing/2010/main" w="9525">
+                <a14:hiddenLine xmlns:a14="http://schemas.microsoft.com/office/drawing/2010/main" xmlns="" w="9525">
                   <a:solidFill>
                     <a:srgbClr val="000000"/>
                   </a:solidFill>
@@ -746,7 +746,7 @@
             </a:ln>
             <a:extLst>
               <a:ext uri="{91240B29-F687-4f45-9708-019B960494DF}">
-                <a14:hiddenLine xmlns="" xmlns:a14="http://schemas.microsoft.com/office/drawing/2010/main" w="9525">
+                <a14:hiddenLine xmlns:a14="http://schemas.microsoft.com/office/drawing/2010/main" xmlns="" w="9525">
                   <a:solidFill>
                     <a:srgbClr val="000000"/>
                   </a:solidFill>
@@ -808,7 +808,7 @@
             </a:ln>
             <a:extLst>
               <a:ext uri="{91240B29-F687-4f45-9708-019B960494DF}">
-                <a14:hiddenLine xmlns="" xmlns:a14="http://schemas.microsoft.com/office/drawing/2010/main" w="9525">
+                <a14:hiddenLine xmlns:a14="http://schemas.microsoft.com/office/drawing/2010/main" xmlns="" w="9525">
                   <a:solidFill>
                     <a:srgbClr val="000000"/>
                   </a:solidFill>
@@ -870,7 +870,7 @@
             </a:ln>
             <a:extLst>
               <a:ext uri="{91240B29-F687-4f45-9708-019B960494DF}">
-                <a14:hiddenLine xmlns="" xmlns:a14="http://schemas.microsoft.com/office/drawing/2010/main" w="9525">
+                <a14:hiddenLine xmlns:a14="http://schemas.microsoft.com/office/drawing/2010/main" xmlns="" w="9525">
                   <a:solidFill>
                     <a:srgbClr val="000000"/>
                   </a:solidFill>
@@ -960,7 +960,7 @@
             </a:ln>
             <a:extLst>
               <a:ext uri="{91240B29-F687-4f45-9708-019B960494DF}">
-                <a14:hiddenLine xmlns="" xmlns:a14="http://schemas.microsoft.com/office/drawing/2010/main" w="9525">
+                <a14:hiddenLine xmlns:a14="http://schemas.microsoft.com/office/drawing/2010/main" xmlns="" w="9525">
                   <a:solidFill>
                     <a:srgbClr val="000000"/>
                   </a:solidFill>
@@ -1050,7 +1050,7 @@
             </a:ln>
             <a:extLst>
               <a:ext uri="{91240B29-F687-4f45-9708-019B960494DF}">
-                <a14:hiddenLine xmlns="" xmlns:a14="http://schemas.microsoft.com/office/drawing/2010/main" w="9525">
+                <a14:hiddenLine xmlns:a14="http://schemas.microsoft.com/office/drawing/2010/main" xmlns="" w="9525">
                   <a:solidFill>
                     <a:srgbClr val="000000"/>
                   </a:solidFill>
@@ -1112,7 +1112,7 @@
             </a:ln>
             <a:extLst>
               <a:ext uri="{91240B29-F687-4f45-9708-019B960494DF}">
-                <a14:hiddenLine xmlns="" xmlns:a14="http://schemas.microsoft.com/office/drawing/2010/main" w="9525">
+                <a14:hiddenLine xmlns:a14="http://schemas.microsoft.com/office/drawing/2010/main" xmlns="" w="9525">
                   <a:solidFill>
                     <a:srgbClr val="000000"/>
                   </a:solidFill>
@@ -1222,7 +1222,7 @@
             </a:ln>
             <a:extLst>
               <a:ext uri="{91240B29-F687-4f45-9708-019B960494DF}">
-                <a14:hiddenLine xmlns="" xmlns:a14="http://schemas.microsoft.com/office/drawing/2010/main" w="9525">
+                <a14:hiddenLine xmlns:a14="http://schemas.microsoft.com/office/drawing/2010/main" xmlns="" w="9525">
                   <a:solidFill>
                     <a:srgbClr val="000000"/>
                   </a:solidFill>
@@ -1284,7 +1284,7 @@
             </a:ln>
             <a:extLst>
               <a:ext uri="{91240B29-F687-4f45-9708-019B960494DF}">
-                <a14:hiddenLine xmlns="" xmlns:a14="http://schemas.microsoft.com/office/drawing/2010/main" w="9525">
+                <a14:hiddenLine xmlns:a14="http://schemas.microsoft.com/office/drawing/2010/main" xmlns="" w="9525">
                   <a:solidFill>
                     <a:srgbClr val="000000"/>
                   </a:solidFill>
@@ -1374,7 +1374,7 @@
             </a:ln>
             <a:extLst>
               <a:ext uri="{91240B29-F687-4f45-9708-019B960494DF}">
-                <a14:hiddenLine xmlns="" xmlns:a14="http://schemas.microsoft.com/office/drawing/2010/main" w="9525">
+                <a14:hiddenLine xmlns:a14="http://schemas.microsoft.com/office/drawing/2010/main" xmlns="" w="9525">
                   <a:solidFill>
                     <a:srgbClr val="000000"/>
                   </a:solidFill>
@@ -1464,7 +1464,7 @@
             </a:ln>
             <a:extLst>
               <a:ext uri="{91240B29-F687-4f45-9708-019B960494DF}">
-                <a14:hiddenLine xmlns="" xmlns:a14="http://schemas.microsoft.com/office/drawing/2010/main" w="9525">
+                <a14:hiddenLine xmlns:a14="http://schemas.microsoft.com/office/drawing/2010/main" xmlns="" w="9525">
                   <a:solidFill>
                     <a:srgbClr val="000000"/>
                   </a:solidFill>
@@ -1526,7 +1526,7 @@
             </a:ln>
             <a:extLst>
               <a:ext uri="{91240B29-F687-4f45-9708-019B960494DF}">
-                <a14:hiddenLine xmlns="" xmlns:a14="http://schemas.microsoft.com/office/drawing/2010/main" w="9525">
+                <a14:hiddenLine xmlns:a14="http://schemas.microsoft.com/office/drawing/2010/main" xmlns="" w="9525">
                   <a:solidFill>
                     <a:srgbClr val="000000"/>
                   </a:solidFill>
@@ -1616,7 +1616,7 @@
             </a:ln>
             <a:extLst>
               <a:ext uri="{91240B29-F687-4f45-9708-019B960494DF}">
-                <a14:hiddenLine xmlns="" xmlns:a14="http://schemas.microsoft.com/office/drawing/2010/main" w="9525">
+                <a14:hiddenLine xmlns:a14="http://schemas.microsoft.com/office/drawing/2010/main" xmlns="" w="9525">
                   <a:solidFill>
                     <a:srgbClr val="000000"/>
                   </a:solidFill>
@@ -1706,7 +1706,7 @@
             </a:ln>
             <a:extLst>
               <a:ext uri="{91240B29-F687-4f45-9708-019B960494DF}">
-                <a14:hiddenLine xmlns="" xmlns:a14="http://schemas.microsoft.com/office/drawing/2010/main" w="9525">
+                <a14:hiddenLine xmlns:a14="http://schemas.microsoft.com/office/drawing/2010/main" xmlns="" w="9525">
                   <a:solidFill>
                     <a:srgbClr val="000000"/>
                   </a:solidFill>
@@ -1762,7 +1762,7 @@
             </a:ln>
             <a:extLst>
               <a:ext uri="{91240B29-F687-4f45-9708-019B960494DF}">
-                <a14:hiddenLine xmlns="" xmlns:a14="http://schemas.microsoft.com/office/drawing/2010/main" w="9525">
+                <a14:hiddenLine xmlns:a14="http://schemas.microsoft.com/office/drawing/2010/main" xmlns="" w="9525">
                   <a:solidFill>
                     <a:srgbClr val="000000"/>
                   </a:solidFill>
@@ -1852,7 +1852,7 @@
             </a:ln>
             <a:extLst>
               <a:ext uri="{91240B29-F687-4f45-9708-019B960494DF}">
-                <a14:hiddenLine xmlns="" xmlns:a14="http://schemas.microsoft.com/office/drawing/2010/main" w="9525">
+                <a14:hiddenLine xmlns:a14="http://schemas.microsoft.com/office/drawing/2010/main" xmlns="" w="9525">
                   <a:solidFill>
                     <a:srgbClr val="000000"/>
                   </a:solidFill>
@@ -1908,7 +1908,7 @@
             </a:ln>
             <a:extLst>
               <a:ext uri="{91240B29-F687-4f45-9708-019B960494DF}">
-                <a14:hiddenLine xmlns="" xmlns:a14="http://schemas.microsoft.com/office/drawing/2010/main" w="9525">
+                <a14:hiddenLine xmlns:a14="http://schemas.microsoft.com/office/drawing/2010/main" xmlns="" w="9525">
                   <a:solidFill>
                     <a:srgbClr val="000000"/>
                   </a:solidFill>
@@ -1998,7 +1998,7 @@
             </a:ln>
             <a:extLst>
               <a:ext uri="{91240B29-F687-4f45-9708-019B960494DF}">
-                <a14:hiddenLine xmlns="" xmlns:a14="http://schemas.microsoft.com/office/drawing/2010/main" w="9525">
+                <a14:hiddenLine xmlns:a14="http://schemas.microsoft.com/office/drawing/2010/main" xmlns="" w="9525">
                   <a:solidFill>
                     <a:srgbClr val="000000"/>
                   </a:solidFill>
@@ -2066,7 +2066,7 @@
             </a:ln>
             <a:extLst>
               <a:ext uri="{91240B29-F687-4f45-9708-019B960494DF}">
-                <a14:hiddenLine xmlns="" xmlns:a14="http://schemas.microsoft.com/office/drawing/2010/main" w="9525">
+                <a14:hiddenLine xmlns:a14="http://schemas.microsoft.com/office/drawing/2010/main" xmlns="" w="9525">
                   <a:solidFill>
                     <a:srgbClr val="000000"/>
                   </a:solidFill>
@@ -2156,7 +2156,7 @@
             </a:ln>
             <a:extLst>
               <a:ext uri="{91240B29-F687-4f45-9708-019B960494DF}">
-                <a14:hiddenLine xmlns="" xmlns:a14="http://schemas.microsoft.com/office/drawing/2010/main" w="9525">
+                <a14:hiddenLine xmlns:a14="http://schemas.microsoft.com/office/drawing/2010/main" xmlns="" w="9525">
                   <a:solidFill>
                     <a:srgbClr val="000000"/>
                   </a:solidFill>
@@ -2224,7 +2224,7 @@
             </a:ln>
             <a:extLst>
               <a:ext uri="{91240B29-F687-4f45-9708-019B960494DF}">
-                <a14:hiddenLine xmlns="" xmlns:a14="http://schemas.microsoft.com/office/drawing/2010/main" w="9525">
+                <a14:hiddenLine xmlns:a14="http://schemas.microsoft.com/office/drawing/2010/main" xmlns="" w="9525">
                   <a:solidFill>
                     <a:srgbClr val="000000"/>
                   </a:solidFill>
@@ -2314,7 +2314,7 @@
             </a:ln>
             <a:extLst>
               <a:ext uri="{91240B29-F687-4f45-9708-019B960494DF}">
-                <a14:hiddenLine xmlns="" xmlns:a14="http://schemas.microsoft.com/office/drawing/2010/main" w="9525">
+                <a14:hiddenLine xmlns:a14="http://schemas.microsoft.com/office/drawing/2010/main" xmlns="" w="9525">
                   <a:solidFill>
                     <a:srgbClr val="000000"/>
                   </a:solidFill>
@@ -2348,7 +2348,7 @@
             </a:ln>
             <a:extLst>
               <a:ext uri="{91240B29-F687-4f45-9708-019B960494DF}">
-                <a14:hiddenLine xmlns="" xmlns:a14="http://schemas.microsoft.com/office/drawing/2010/main" w="9525">
+                <a14:hiddenLine xmlns:a14="http://schemas.microsoft.com/office/drawing/2010/main" xmlns="" w="9525">
                   <a:solidFill>
                     <a:srgbClr val="000000"/>
                   </a:solidFill>
@@ -2438,7 +2438,7 @@
             </a:ln>
             <a:extLst>
               <a:ext uri="{91240B29-F687-4f45-9708-019B960494DF}">
-                <a14:hiddenLine xmlns="" xmlns:a14="http://schemas.microsoft.com/office/drawing/2010/main" w="9525">
+                <a14:hiddenLine xmlns:a14="http://schemas.microsoft.com/office/drawing/2010/main" xmlns="" w="9525">
                   <a:solidFill>
                     <a:srgbClr val="000000"/>
                   </a:solidFill>
@@ -2500,7 +2500,7 @@
             </a:ln>
             <a:extLst>
               <a:ext uri="{91240B29-F687-4f45-9708-019B960494DF}">
-                <a14:hiddenLine xmlns="" xmlns:a14="http://schemas.microsoft.com/office/drawing/2010/main" w="9525">
+                <a14:hiddenLine xmlns:a14="http://schemas.microsoft.com/office/drawing/2010/main" xmlns="" w="9525">
                   <a:solidFill>
                     <a:srgbClr val="000000"/>
                   </a:solidFill>
@@ -2562,7 +2562,7 @@
             </a:ln>
             <a:extLst>
               <a:ext uri="{91240B29-F687-4f45-9708-019B960494DF}">
-                <a14:hiddenLine xmlns="" xmlns:a14="http://schemas.microsoft.com/office/drawing/2010/main" w="9525">
+                <a14:hiddenLine xmlns:a14="http://schemas.microsoft.com/office/drawing/2010/main" xmlns="" w="9525">
                   <a:solidFill>
                     <a:srgbClr val="000000"/>
                   </a:solidFill>
@@ -2652,7 +2652,7 @@
             </a:ln>
             <a:extLst>
               <a:ext uri="{91240B29-F687-4f45-9708-019B960494DF}">
-                <a14:hiddenLine xmlns="" xmlns:a14="http://schemas.microsoft.com/office/drawing/2010/main" w="9525">
+                <a14:hiddenLine xmlns:a14="http://schemas.microsoft.com/office/drawing/2010/main" xmlns="" w="9525">
                   <a:solidFill>
                     <a:srgbClr val="000000"/>
                   </a:solidFill>
@@ -2720,7 +2720,7 @@
             </a:ln>
             <a:extLst>
               <a:ext uri="{91240B29-F687-4f45-9708-019B960494DF}">
-                <a14:hiddenLine xmlns="" xmlns:a14="http://schemas.microsoft.com/office/drawing/2010/main" w="9525">
+                <a14:hiddenLine xmlns:a14="http://schemas.microsoft.com/office/drawing/2010/main" xmlns="" w="9525">
                   <a:solidFill>
                     <a:srgbClr val="000000"/>
                   </a:solidFill>
@@ -2782,7 +2782,7 @@
             </a:ln>
             <a:extLst>
               <a:ext uri="{91240B29-F687-4f45-9708-019B960494DF}">
-                <a14:hiddenLine xmlns="" xmlns:a14="http://schemas.microsoft.com/office/drawing/2010/main" w="9525">
+                <a14:hiddenLine xmlns:a14="http://schemas.microsoft.com/office/drawing/2010/main" xmlns="" w="9525">
                   <a:solidFill>
                     <a:srgbClr val="000000"/>
                   </a:solidFill>
@@ -2872,7 +2872,7 @@
             </a:ln>
             <a:extLst>
               <a:ext uri="{91240B29-F687-4f45-9708-019B960494DF}">
-                <a14:hiddenLine xmlns="" xmlns:a14="http://schemas.microsoft.com/office/drawing/2010/main" w="9525">
+                <a14:hiddenLine xmlns:a14="http://schemas.microsoft.com/office/drawing/2010/main" xmlns="" w="9525">
                   <a:solidFill>
                     <a:srgbClr val="000000"/>
                   </a:solidFill>
@@ -2934,7 +2934,7 @@
             </a:ln>
             <a:extLst>
               <a:ext uri="{91240B29-F687-4f45-9708-019B960494DF}">
-                <a14:hiddenLine xmlns="" xmlns:a14="http://schemas.microsoft.com/office/drawing/2010/main" w="9525">
+                <a14:hiddenLine xmlns:a14="http://schemas.microsoft.com/office/drawing/2010/main" xmlns="" w="9525">
                   <a:solidFill>
                     <a:srgbClr val="000000"/>
                   </a:solidFill>
@@ -3024,7 +3024,7 @@
             </a:ln>
             <a:extLst>
               <a:ext uri="{91240B29-F687-4f45-9708-019B960494DF}">
-                <a14:hiddenLine xmlns="" xmlns:a14="http://schemas.microsoft.com/office/drawing/2010/main" w="9525">
+                <a14:hiddenLine xmlns:a14="http://schemas.microsoft.com/office/drawing/2010/main" xmlns="" w="9525">
                   <a:solidFill>
                     <a:srgbClr val="000000"/>
                   </a:solidFill>
@@ -3086,7 +3086,7 @@
             </a:ln>
             <a:extLst>
               <a:ext uri="{91240B29-F687-4f45-9708-019B960494DF}">
-                <a14:hiddenLine xmlns="" xmlns:a14="http://schemas.microsoft.com/office/drawing/2010/main" w="9525">
+                <a14:hiddenLine xmlns:a14="http://schemas.microsoft.com/office/drawing/2010/main" xmlns="" w="9525">
                   <a:solidFill>
                     <a:srgbClr val="000000"/>
                   </a:solidFill>
@@ -3176,7 +3176,7 @@
             </a:ln>
             <a:extLst>
               <a:ext uri="{91240B29-F687-4f45-9708-019B960494DF}">
-                <a14:hiddenLine xmlns="" xmlns:a14="http://schemas.microsoft.com/office/drawing/2010/main" w="9525">
+                <a14:hiddenLine xmlns:a14="http://schemas.microsoft.com/office/drawing/2010/main" xmlns="" w="9525">
                   <a:solidFill>
                     <a:srgbClr val="000000"/>
                   </a:solidFill>
@@ -3210,7 +3210,7 @@
             </a:ln>
             <a:extLst>
               <a:ext uri="{91240B29-F687-4f45-9708-019B960494DF}">
-                <a14:hiddenLine xmlns="" xmlns:a14="http://schemas.microsoft.com/office/drawing/2010/main" w="9525">
+                <a14:hiddenLine xmlns:a14="http://schemas.microsoft.com/office/drawing/2010/main" xmlns="" w="9525">
                   <a:solidFill>
                     <a:srgbClr val="000000"/>
                   </a:solidFill>
@@ -3275,7 +3275,7 @@
             </a:ln>
             <a:extLst>
               <a:ext uri="{91240B29-F687-4f45-9708-019B960494DF}">
-                <a14:hiddenLine xmlns="" xmlns:a14="http://schemas.microsoft.com/office/drawing/2010/main" w="9525">
+                <a14:hiddenLine xmlns:a14="http://schemas.microsoft.com/office/drawing/2010/main" xmlns="" w="9525">
                   <a:solidFill>
                     <a:srgbClr val="000000"/>
                   </a:solidFill>
@@ -3365,7 +3365,7 @@
             </a:ln>
             <a:extLst>
               <a:ext uri="{91240B29-F687-4f45-9708-019B960494DF}">
-                <a14:hiddenLine xmlns="" xmlns:a14="http://schemas.microsoft.com/office/drawing/2010/main" w="9525">
+                <a14:hiddenLine xmlns:a14="http://schemas.microsoft.com/office/drawing/2010/main" xmlns="" w="9525">
                   <a:solidFill>
                     <a:srgbClr val="000000"/>
                   </a:solidFill>
@@ -3427,7 +3427,7 @@
             </a:ln>
             <a:extLst>
               <a:ext uri="{91240B29-F687-4f45-9708-019B960494DF}">
-                <a14:hiddenLine xmlns="" xmlns:a14="http://schemas.microsoft.com/office/drawing/2010/main" w="9525">
+                <a14:hiddenLine xmlns:a14="http://schemas.microsoft.com/office/drawing/2010/main" xmlns="" w="9525">
                   <a:solidFill>
                     <a:srgbClr val="000000"/>
                   </a:solidFill>
@@ -3517,7 +3517,7 @@
             </a:ln>
             <a:extLst>
               <a:ext uri="{91240B29-F687-4f45-9708-019B960494DF}">
-                <a14:hiddenLine xmlns="" xmlns:a14="http://schemas.microsoft.com/office/drawing/2010/main" w="9525">
+                <a14:hiddenLine xmlns:a14="http://schemas.microsoft.com/office/drawing/2010/main" xmlns="" w="9525">
                   <a:solidFill>
                     <a:srgbClr val="000000"/>
                   </a:solidFill>
@@ -3607,7 +3607,7 @@
             </a:ln>
             <a:extLst>
               <a:ext uri="{91240B29-F687-4f45-9708-019B960494DF}">
-                <a14:hiddenLine xmlns="" xmlns:a14="http://schemas.microsoft.com/office/drawing/2010/main" w="9525">
+                <a14:hiddenLine xmlns:a14="http://schemas.microsoft.com/office/drawing/2010/main" xmlns="" w="9525">
                   <a:solidFill>
                     <a:srgbClr val="000000"/>
                   </a:solidFill>
@@ -3672,7 +3672,7 @@
             </a:ln>
             <a:extLst>
               <a:ext uri="{91240B29-F687-4f45-9708-019B960494DF}">
-                <a14:hiddenLine xmlns="" xmlns:a14="http://schemas.microsoft.com/office/drawing/2010/main" w="9525">
+                <a14:hiddenLine xmlns:a14="http://schemas.microsoft.com/office/drawing/2010/main" xmlns="" w="9525">
                   <a:solidFill>
                     <a:srgbClr val="000000"/>
                   </a:solidFill>
@@ -3734,7 +3734,7 @@
             </a:ln>
             <a:extLst>
               <a:ext uri="{91240B29-F687-4f45-9708-019B960494DF}">
-                <a14:hiddenLine xmlns="" xmlns:a14="http://schemas.microsoft.com/office/drawing/2010/main" w="9525">
+                <a14:hiddenLine xmlns:a14="http://schemas.microsoft.com/office/drawing/2010/main" xmlns="" w="9525">
                   <a:solidFill>
                     <a:srgbClr val="000000"/>
                   </a:solidFill>
@@ -3824,7 +3824,7 @@
             </a:ln>
             <a:extLst>
               <a:ext uri="{91240B29-F687-4f45-9708-019B960494DF}">
-                <a14:hiddenLine xmlns="" xmlns:a14="http://schemas.microsoft.com/office/drawing/2010/main" w="9525">
+                <a14:hiddenLine xmlns:a14="http://schemas.microsoft.com/office/drawing/2010/main" xmlns="" w="9525">
                   <a:solidFill>
                     <a:srgbClr val="000000"/>
                   </a:solidFill>
@@ -3914,7 +3914,7 @@
             </a:ln>
             <a:extLst>
               <a:ext uri="{91240B29-F687-4f45-9708-019B960494DF}">
-                <a14:hiddenLine xmlns="" xmlns:a14="http://schemas.microsoft.com/office/drawing/2010/main" w="9525">
+                <a14:hiddenLine xmlns:a14="http://schemas.microsoft.com/office/drawing/2010/main" xmlns="" w="9525">
                   <a:solidFill>
                     <a:srgbClr val="000000"/>
                   </a:solidFill>
@@ -3976,7 +3976,7 @@
             </a:ln>
             <a:extLst>
               <a:ext uri="{91240B29-F687-4f45-9708-019B960494DF}">
-                <a14:hiddenLine xmlns="" xmlns:a14="http://schemas.microsoft.com/office/drawing/2010/main" w="9525">
+                <a14:hiddenLine xmlns:a14="http://schemas.microsoft.com/office/drawing/2010/main" xmlns="" w="9525">
                   <a:solidFill>
                     <a:srgbClr val="000000"/>
                   </a:solidFill>
@@ -4096,7 +4096,7 @@
             </a:ln>
             <a:extLst>
               <a:ext uri="{91240B29-F687-4f45-9708-019B960494DF}">
-                <a14:hiddenLine xmlns="" xmlns:a14="http://schemas.microsoft.com/office/drawing/2010/main" w="9525">
+                <a14:hiddenLine xmlns:a14="http://schemas.microsoft.com/office/drawing/2010/main" xmlns="" w="9525">
                   <a:solidFill>
                     <a:srgbClr val="000000"/>
                   </a:solidFill>
@@ -4164,7 +4164,7 @@
             </a:ln>
             <a:extLst>
               <a:ext uri="{91240B29-F687-4f45-9708-019B960494DF}">
-                <a14:hiddenLine xmlns="" xmlns:a14="http://schemas.microsoft.com/office/drawing/2010/main" w="9525">
+                <a14:hiddenLine xmlns:a14="http://schemas.microsoft.com/office/drawing/2010/main" xmlns="" w="9525">
                   <a:solidFill>
                     <a:srgbClr val="000000"/>
                   </a:solidFill>
@@ -4254,7 +4254,7 @@
             </a:ln>
             <a:extLst>
               <a:ext uri="{91240B29-F687-4f45-9708-019B960494DF}">
-                <a14:hiddenLine xmlns="" xmlns:a14="http://schemas.microsoft.com/office/drawing/2010/main" w="9525">
+                <a14:hiddenLine xmlns:a14="http://schemas.microsoft.com/office/drawing/2010/main" xmlns="" w="9525">
                   <a:solidFill>
                     <a:srgbClr val="000000"/>
                   </a:solidFill>
@@ -4394,7 +4394,7 @@
           <a:p>
             <a:fld id="{AC1EE09D-E7E8-4C46-8584-2F5548DCD08C}" type="datetimeFigureOut">
               <a:rPr lang="en-GB" smtClean="0"/>
-              <a:t>19/03/2019</a:t>
+              <a:t>20/03/2019</a:t>
             </a:fld>
             <a:endParaRPr lang="en-GB"/>
           </a:p>
@@ -4661,7 +4661,7 @@
           <a:p>
             <a:fld id="{AC1EE09D-E7E8-4C46-8584-2F5548DCD08C}" type="datetimeFigureOut">
               <a:rPr lang="en-GB" smtClean="0"/>
-              <a:t>19/03/2019</a:t>
+              <a:t>20/03/2019</a:t>
             </a:fld>
             <a:endParaRPr lang="en-GB"/>
           </a:p>
@@ -4857,7 +4857,7 @@
           <a:p>
             <a:fld id="{AC1EE09D-E7E8-4C46-8584-2F5548DCD08C}" type="datetimeFigureOut">
               <a:rPr lang="en-GB" smtClean="0"/>
-              <a:t>19/03/2019</a:t>
+              <a:t>20/03/2019</a:t>
             </a:fld>
             <a:endParaRPr lang="en-GB"/>
           </a:p>
@@ -5120,7 +5120,7 @@
           <a:p>
             <a:fld id="{AC1EE09D-E7E8-4C46-8584-2F5548DCD08C}" type="datetimeFigureOut">
               <a:rPr lang="en-GB" smtClean="0"/>
-              <a:t>19/03/2019</a:t>
+              <a:t>20/03/2019</a:t>
             </a:fld>
             <a:endParaRPr lang="en-GB"/>
           </a:p>
@@ -5554,7 +5554,7 @@
           <a:p>
             <a:fld id="{AC1EE09D-E7E8-4C46-8584-2F5548DCD08C}" type="datetimeFigureOut">
               <a:rPr lang="en-GB" smtClean="0"/>
-              <a:t>19/03/2019</a:t>
+              <a:t>20/03/2019</a:t>
             </a:fld>
             <a:endParaRPr lang="en-GB"/>
           </a:p>
@@ -6100,7 +6100,7 @@
           <a:p>
             <a:fld id="{AC1EE09D-E7E8-4C46-8584-2F5548DCD08C}" type="datetimeFigureOut">
               <a:rPr lang="en-GB" smtClean="0"/>
-              <a:t>19/03/2019</a:t>
+              <a:t>20/03/2019</a:t>
             </a:fld>
             <a:endParaRPr lang="en-GB"/>
           </a:p>
@@ -6820,7 +6820,7 @@
           <a:p>
             <a:fld id="{AC1EE09D-E7E8-4C46-8584-2F5548DCD08C}" type="datetimeFigureOut">
               <a:rPr lang="en-GB" smtClean="0"/>
-              <a:t>19/03/2019</a:t>
+              <a:t>20/03/2019</a:t>
             </a:fld>
             <a:endParaRPr lang="en-GB"/>
           </a:p>
@@ -6990,7 +6990,7 @@
           <a:p>
             <a:fld id="{AC1EE09D-E7E8-4C46-8584-2F5548DCD08C}" type="datetimeFigureOut">
               <a:rPr lang="en-GB" smtClean="0"/>
-              <a:t>19/03/2019</a:t>
+              <a:t>20/03/2019</a:t>
             </a:fld>
             <a:endParaRPr lang="en-GB"/>
           </a:p>
@@ -7170,7 +7170,7 @@
           <a:p>
             <a:fld id="{AC1EE09D-E7E8-4C46-8584-2F5548DCD08C}" type="datetimeFigureOut">
               <a:rPr lang="en-GB" smtClean="0"/>
-              <a:t>19/03/2019</a:t>
+              <a:t>20/03/2019</a:t>
             </a:fld>
             <a:endParaRPr lang="en-GB"/>
           </a:p>
@@ -7340,7 +7340,7 @@
           <a:p>
             <a:fld id="{AC1EE09D-E7E8-4C46-8584-2F5548DCD08C}" type="datetimeFigureOut">
               <a:rPr lang="en-GB" smtClean="0"/>
-              <a:t>19/03/2019</a:t>
+              <a:t>20/03/2019</a:t>
             </a:fld>
             <a:endParaRPr lang="en-GB"/>
           </a:p>
@@ -7590,7 +7590,7 @@
           <a:p>
             <a:fld id="{AC1EE09D-E7E8-4C46-8584-2F5548DCD08C}" type="datetimeFigureOut">
               <a:rPr lang="en-GB" smtClean="0"/>
-              <a:t>19/03/2019</a:t>
+              <a:t>20/03/2019</a:t>
             </a:fld>
             <a:endParaRPr lang="en-GB"/>
           </a:p>
@@ -7822,7 +7822,7 @@
           <a:p>
             <a:fld id="{AC1EE09D-E7E8-4C46-8584-2F5548DCD08C}" type="datetimeFigureOut">
               <a:rPr lang="en-GB" smtClean="0"/>
-              <a:t>19/03/2019</a:t>
+              <a:t>20/03/2019</a:t>
             </a:fld>
             <a:endParaRPr lang="en-GB"/>
           </a:p>
@@ -8203,7 +8203,7 @@
           <a:p>
             <a:fld id="{AC1EE09D-E7E8-4C46-8584-2F5548DCD08C}" type="datetimeFigureOut">
               <a:rPr lang="en-GB" smtClean="0"/>
-              <a:t>19/03/2019</a:t>
+              <a:t>20/03/2019</a:t>
             </a:fld>
             <a:endParaRPr lang="en-GB"/>
           </a:p>
@@ -8321,7 +8321,7 @@
           <a:p>
             <a:fld id="{AC1EE09D-E7E8-4C46-8584-2F5548DCD08C}" type="datetimeFigureOut">
               <a:rPr lang="en-GB" smtClean="0"/>
-              <a:t>19/03/2019</a:t>
+              <a:t>20/03/2019</a:t>
             </a:fld>
             <a:endParaRPr lang="en-GB"/>
           </a:p>
@@ -8416,7 +8416,7 @@
           <a:p>
             <a:fld id="{AC1EE09D-E7E8-4C46-8584-2F5548DCD08C}" type="datetimeFigureOut">
               <a:rPr lang="en-GB" smtClean="0"/>
-              <a:t>19/03/2019</a:t>
+              <a:t>20/03/2019</a:t>
             </a:fld>
             <a:endParaRPr lang="en-GB"/>
           </a:p>
@@ -8665,7 +8665,7 @@
           <a:p>
             <a:fld id="{AC1EE09D-E7E8-4C46-8584-2F5548DCD08C}" type="datetimeFigureOut">
               <a:rPr lang="en-GB" smtClean="0"/>
-              <a:t>19/03/2019</a:t>
+              <a:t>20/03/2019</a:t>
             </a:fld>
             <a:endParaRPr lang="en-GB"/>
           </a:p>
@@ -8945,7 +8945,7 @@
           <a:p>
             <a:fld id="{AC1EE09D-E7E8-4C46-8584-2F5548DCD08C}" type="datetimeFigureOut">
               <a:rPr lang="en-GB" smtClean="0"/>
-              <a:t>19/03/2019</a:t>
+              <a:t>20/03/2019</a:t>
             </a:fld>
             <a:endParaRPr lang="en-GB"/>
           </a:p>
@@ -9061,7 +9061,7 @@
           <a:noFill/>
           <a:extLst>
             <a:ext uri="{909E8E84-426E-40dd-AFC4-6F175D3DCCD1}">
-              <a14:hiddenFill xmlns="" xmlns:a14="http://schemas.microsoft.com/office/drawing/2010/main">
+              <a14:hiddenFill xmlns:a14="http://schemas.microsoft.com/office/drawing/2010/main" xmlns="">
                 <a:solidFill>
                   <a:srgbClr val="FFFFFF"/>
                 </a:solidFill>
@@ -9135,7 +9135,7 @@
               </a:ln>
               <a:extLst>
                 <a:ext uri="{91240B29-F687-4f45-9708-019B960494DF}">
-                  <a14:hiddenLine xmlns="" xmlns:a14="http://schemas.microsoft.com/office/drawing/2010/main" w="9525">
+                  <a14:hiddenLine xmlns:a14="http://schemas.microsoft.com/office/drawing/2010/main" xmlns="" w="9525">
                     <a:solidFill>
                       <a:srgbClr val="000000"/>
                     </a:solidFill>
@@ -9225,7 +9225,7 @@
               </a:ln>
               <a:extLst>
                 <a:ext uri="{91240B29-F687-4f45-9708-019B960494DF}">
-                  <a14:hiddenLine xmlns="" xmlns:a14="http://schemas.microsoft.com/office/drawing/2010/main" w="9525">
+                  <a14:hiddenLine xmlns:a14="http://schemas.microsoft.com/office/drawing/2010/main" xmlns="" w="9525">
                     <a:solidFill>
                       <a:srgbClr val="000000"/>
                     </a:solidFill>
@@ -9315,7 +9315,7 @@
               </a:ln>
               <a:extLst>
                 <a:ext uri="{91240B29-F687-4f45-9708-019B960494DF}">
-                  <a14:hiddenLine xmlns="" xmlns:a14="http://schemas.microsoft.com/office/drawing/2010/main" w="9525">
+                  <a14:hiddenLine xmlns:a14="http://schemas.microsoft.com/office/drawing/2010/main" xmlns="" w="9525">
                     <a:solidFill>
                       <a:srgbClr val="000000"/>
                     </a:solidFill>
@@ -9377,7 +9377,7 @@
               </a:ln>
               <a:extLst>
                 <a:ext uri="{91240B29-F687-4f45-9708-019B960494DF}">
-                  <a14:hiddenLine xmlns="" xmlns:a14="http://schemas.microsoft.com/office/drawing/2010/main" w="9525">
+                  <a14:hiddenLine xmlns:a14="http://schemas.microsoft.com/office/drawing/2010/main" xmlns="" w="9525">
                     <a:solidFill>
                       <a:srgbClr val="000000"/>
                     </a:solidFill>
@@ -9467,7 +9467,7 @@
               </a:ln>
               <a:extLst>
                 <a:ext uri="{91240B29-F687-4f45-9708-019B960494DF}">
-                  <a14:hiddenLine xmlns="" xmlns:a14="http://schemas.microsoft.com/office/drawing/2010/main" w="9525">
+                  <a14:hiddenLine xmlns:a14="http://schemas.microsoft.com/office/drawing/2010/main" xmlns="" w="9525">
                     <a:solidFill>
                       <a:srgbClr val="000000"/>
                     </a:solidFill>
@@ -9529,7 +9529,7 @@
               </a:ln>
               <a:extLst>
                 <a:ext uri="{91240B29-F687-4f45-9708-019B960494DF}">
-                  <a14:hiddenLine xmlns="" xmlns:a14="http://schemas.microsoft.com/office/drawing/2010/main" w="9525">
+                  <a14:hiddenLine xmlns:a14="http://schemas.microsoft.com/office/drawing/2010/main" xmlns="" w="9525">
                     <a:solidFill>
                       <a:srgbClr val="000000"/>
                     </a:solidFill>
@@ -9591,7 +9591,7 @@
               </a:ln>
               <a:extLst>
                 <a:ext uri="{91240B29-F687-4f45-9708-019B960494DF}">
-                  <a14:hiddenLine xmlns="" xmlns:a14="http://schemas.microsoft.com/office/drawing/2010/main" w="9525">
+                  <a14:hiddenLine xmlns:a14="http://schemas.microsoft.com/office/drawing/2010/main" xmlns="" w="9525">
                     <a:solidFill>
                       <a:srgbClr val="000000"/>
                     </a:solidFill>
@@ -9681,7 +9681,7 @@
               </a:ln>
               <a:extLst>
                 <a:ext uri="{91240B29-F687-4f45-9708-019B960494DF}">
-                  <a14:hiddenLine xmlns="" xmlns:a14="http://schemas.microsoft.com/office/drawing/2010/main" w="9525">
+                  <a14:hiddenLine xmlns:a14="http://schemas.microsoft.com/office/drawing/2010/main" xmlns="" w="9525">
                     <a:solidFill>
                       <a:srgbClr val="000000"/>
                     </a:solidFill>
@@ -9771,7 +9771,7 @@
               </a:ln>
               <a:extLst>
                 <a:ext uri="{91240B29-F687-4f45-9708-019B960494DF}">
-                  <a14:hiddenLine xmlns="" xmlns:a14="http://schemas.microsoft.com/office/drawing/2010/main" w="9525">
+                  <a14:hiddenLine xmlns:a14="http://schemas.microsoft.com/office/drawing/2010/main" xmlns="" w="9525">
                     <a:solidFill>
                       <a:srgbClr val="000000"/>
                     </a:solidFill>
@@ -9833,7 +9833,7 @@
               </a:ln>
               <a:extLst>
                 <a:ext uri="{91240B29-F687-4f45-9708-019B960494DF}">
-                  <a14:hiddenLine xmlns="" xmlns:a14="http://schemas.microsoft.com/office/drawing/2010/main" w="9525">
+                  <a14:hiddenLine xmlns:a14="http://schemas.microsoft.com/office/drawing/2010/main" xmlns="" w="9525">
                     <a:solidFill>
                       <a:srgbClr val="000000"/>
                     </a:solidFill>
@@ -9943,7 +9943,7 @@
               </a:ln>
               <a:extLst>
                 <a:ext uri="{91240B29-F687-4f45-9708-019B960494DF}">
-                  <a14:hiddenLine xmlns="" xmlns:a14="http://schemas.microsoft.com/office/drawing/2010/main" w="9525">
+                  <a14:hiddenLine xmlns:a14="http://schemas.microsoft.com/office/drawing/2010/main" xmlns="" w="9525">
                     <a:solidFill>
                       <a:srgbClr val="000000"/>
                     </a:solidFill>
@@ -10027,7 +10027,7 @@
               </a:ln>
               <a:extLst>
                 <a:ext uri="{91240B29-F687-4f45-9708-019B960494DF}">
-                  <a14:hiddenLine xmlns="" xmlns:a14="http://schemas.microsoft.com/office/drawing/2010/main" w="9525">
+                  <a14:hiddenLine xmlns:a14="http://schemas.microsoft.com/office/drawing/2010/main" xmlns="" w="9525">
                     <a:solidFill>
                       <a:srgbClr val="000000"/>
                     </a:solidFill>
@@ -10089,7 +10089,7 @@
               </a:ln>
               <a:extLst>
                 <a:ext uri="{91240B29-F687-4f45-9708-019B960494DF}">
-                  <a14:hiddenLine xmlns="" xmlns:a14="http://schemas.microsoft.com/office/drawing/2010/main" w="9525">
+                  <a14:hiddenLine xmlns:a14="http://schemas.microsoft.com/office/drawing/2010/main" xmlns="" w="9525">
                     <a:solidFill>
                       <a:srgbClr val="000000"/>
                     </a:solidFill>
@@ -10151,7 +10151,7 @@
               </a:ln>
               <a:extLst>
                 <a:ext uri="{91240B29-F687-4f45-9708-019B960494DF}">
-                  <a14:hiddenLine xmlns="" xmlns:a14="http://schemas.microsoft.com/office/drawing/2010/main" w="9525">
+                  <a14:hiddenLine xmlns:a14="http://schemas.microsoft.com/office/drawing/2010/main" xmlns="" w="9525">
                     <a:solidFill>
                       <a:srgbClr val="000000"/>
                     </a:solidFill>
@@ -10241,7 +10241,7 @@
               </a:ln>
               <a:extLst>
                 <a:ext uri="{91240B29-F687-4f45-9708-019B960494DF}">
-                  <a14:hiddenLine xmlns="" xmlns:a14="http://schemas.microsoft.com/office/drawing/2010/main" w="9525">
+                  <a14:hiddenLine xmlns:a14="http://schemas.microsoft.com/office/drawing/2010/main" xmlns="" w="9525">
                     <a:solidFill>
                       <a:srgbClr val="000000"/>
                     </a:solidFill>
@@ -10275,7 +10275,7 @@
               </a:ln>
               <a:extLst>
                 <a:ext uri="{91240B29-F687-4f45-9708-019B960494DF}">
-                  <a14:hiddenLine xmlns="" xmlns:a14="http://schemas.microsoft.com/office/drawing/2010/main" w="9525">
+                  <a14:hiddenLine xmlns:a14="http://schemas.microsoft.com/office/drawing/2010/main" xmlns="" w="9525">
                     <a:solidFill>
                       <a:srgbClr val="000000"/>
                     </a:solidFill>
@@ -10340,7 +10340,7 @@
               </a:ln>
               <a:extLst>
                 <a:ext uri="{91240B29-F687-4f45-9708-019B960494DF}">
-                  <a14:hiddenLine xmlns="" xmlns:a14="http://schemas.microsoft.com/office/drawing/2010/main" w="9525">
+                  <a14:hiddenLine xmlns:a14="http://schemas.microsoft.com/office/drawing/2010/main" xmlns="" w="9525">
                     <a:solidFill>
                       <a:srgbClr val="000000"/>
                     </a:solidFill>
@@ -10430,7 +10430,7 @@
               </a:ln>
               <a:extLst>
                 <a:ext uri="{91240B29-F687-4f45-9708-019B960494DF}">
-                  <a14:hiddenLine xmlns="" xmlns:a14="http://schemas.microsoft.com/office/drawing/2010/main" w="9525">
+                  <a14:hiddenLine xmlns:a14="http://schemas.microsoft.com/office/drawing/2010/main" xmlns="" w="9525">
                     <a:solidFill>
                       <a:srgbClr val="000000"/>
                     </a:solidFill>
@@ -10492,7 +10492,7 @@
               </a:ln>
               <a:extLst>
                 <a:ext uri="{91240B29-F687-4f45-9708-019B960494DF}">
-                  <a14:hiddenLine xmlns="" xmlns:a14="http://schemas.microsoft.com/office/drawing/2010/main" w="9525">
+                  <a14:hiddenLine xmlns:a14="http://schemas.microsoft.com/office/drawing/2010/main" xmlns="" w="9525">
                     <a:solidFill>
                       <a:srgbClr val="000000"/>
                     </a:solidFill>
@@ -10582,7 +10582,7 @@
               </a:ln>
               <a:extLst>
                 <a:ext uri="{91240B29-F687-4f45-9708-019B960494DF}">
-                  <a14:hiddenLine xmlns="" xmlns:a14="http://schemas.microsoft.com/office/drawing/2010/main" w="9525">
+                  <a14:hiddenLine xmlns:a14="http://schemas.microsoft.com/office/drawing/2010/main" xmlns="" w="9525">
                     <a:solidFill>
                       <a:srgbClr val="000000"/>
                     </a:solidFill>
@@ -10647,7 +10647,7 @@
               </a:ln>
               <a:extLst>
                 <a:ext uri="{91240B29-F687-4f45-9708-019B960494DF}">
-                  <a14:hiddenLine xmlns="" xmlns:a14="http://schemas.microsoft.com/office/drawing/2010/main" w="9525">
+                  <a14:hiddenLine xmlns:a14="http://schemas.microsoft.com/office/drawing/2010/main" xmlns="" w="9525">
                     <a:solidFill>
                       <a:srgbClr val="000000"/>
                     </a:solidFill>
@@ -10709,7 +10709,7 @@
               </a:ln>
               <a:extLst>
                 <a:ext uri="{91240B29-F687-4f45-9708-019B960494DF}">
-                  <a14:hiddenLine xmlns="" xmlns:a14="http://schemas.microsoft.com/office/drawing/2010/main" w="9525">
+                  <a14:hiddenLine xmlns:a14="http://schemas.microsoft.com/office/drawing/2010/main" xmlns="" w="9525">
                     <a:solidFill>
                       <a:srgbClr val="000000"/>
                     </a:solidFill>
@@ -10799,7 +10799,7 @@
               </a:ln>
               <a:extLst>
                 <a:ext uri="{91240B29-F687-4f45-9708-019B960494DF}">
-                  <a14:hiddenLine xmlns="" xmlns:a14="http://schemas.microsoft.com/office/drawing/2010/main" w="9525">
+                  <a14:hiddenLine xmlns:a14="http://schemas.microsoft.com/office/drawing/2010/main" xmlns="" w="9525">
                     <a:solidFill>
                       <a:srgbClr val="000000"/>
                     </a:solidFill>
@@ -10889,7 +10889,7 @@
               </a:ln>
               <a:extLst>
                 <a:ext uri="{91240B29-F687-4f45-9708-019B960494DF}">
-                  <a14:hiddenLine xmlns="" xmlns:a14="http://schemas.microsoft.com/office/drawing/2010/main" w="9525">
+                  <a14:hiddenLine xmlns:a14="http://schemas.microsoft.com/office/drawing/2010/main" xmlns="" w="9525">
                     <a:solidFill>
                       <a:srgbClr val="000000"/>
                     </a:solidFill>
@@ -10954,7 +10954,7 @@
               </a:ln>
               <a:extLst>
                 <a:ext uri="{91240B29-F687-4f45-9708-019B960494DF}">
-                  <a14:hiddenLine xmlns="" xmlns:a14="http://schemas.microsoft.com/office/drawing/2010/main" w="9525">
+                  <a14:hiddenLine xmlns:a14="http://schemas.microsoft.com/office/drawing/2010/main" xmlns="" w="9525">
                     <a:solidFill>
                       <a:srgbClr val="000000"/>
                     </a:solidFill>
@@ -11074,7 +11074,7 @@
               </a:ln>
               <a:extLst>
                 <a:ext uri="{91240B29-F687-4f45-9708-019B960494DF}">
-                  <a14:hiddenLine xmlns="" xmlns:a14="http://schemas.microsoft.com/office/drawing/2010/main" w="9525">
+                  <a14:hiddenLine xmlns:a14="http://schemas.microsoft.com/office/drawing/2010/main" xmlns="" w="9525">
                     <a:solidFill>
                       <a:srgbClr val="000000"/>
                     </a:solidFill>
@@ -11172,7 +11172,7 @@
               </a:ln>
               <a:extLst>
                 <a:ext uri="{91240B29-F687-4f45-9708-019B960494DF}">
-                  <a14:hiddenLine xmlns="" xmlns:a14="http://schemas.microsoft.com/office/drawing/2010/main" w="9525">
+                  <a14:hiddenLine xmlns:a14="http://schemas.microsoft.com/office/drawing/2010/main" xmlns="" w="9525">
                     <a:solidFill>
                       <a:srgbClr val="000000"/>
                     </a:solidFill>
@@ -11287,7 +11287,7 @@
               </a:ln>
               <a:extLst>
                 <a:ext uri="{91240B29-F687-4f45-9708-019B960494DF}">
-                  <a14:hiddenLine xmlns="" xmlns:a14="http://schemas.microsoft.com/office/drawing/2010/main" w="9525">
+                  <a14:hiddenLine xmlns:a14="http://schemas.microsoft.com/office/drawing/2010/main" xmlns="" w="9525">
                     <a:solidFill>
                       <a:srgbClr val="000000"/>
                     </a:solidFill>
@@ -11377,7 +11377,7 @@
               </a:ln>
               <a:extLst>
                 <a:ext uri="{91240B29-F687-4f45-9708-019B960494DF}">
-                  <a14:hiddenLine xmlns="" xmlns:a14="http://schemas.microsoft.com/office/drawing/2010/main" w="9525">
+                  <a14:hiddenLine xmlns:a14="http://schemas.microsoft.com/office/drawing/2010/main" xmlns="" w="9525">
                     <a:solidFill>
                       <a:srgbClr val="000000"/>
                     </a:solidFill>
@@ -11442,7 +11442,7 @@
               </a:ln>
               <a:extLst>
                 <a:ext uri="{91240B29-F687-4f45-9708-019B960494DF}">
-                  <a14:hiddenLine xmlns="" xmlns:a14="http://schemas.microsoft.com/office/drawing/2010/main" w="9525">
+                  <a14:hiddenLine xmlns:a14="http://schemas.microsoft.com/office/drawing/2010/main" xmlns="" w="9525">
                     <a:solidFill>
                       <a:srgbClr val="000000"/>
                     </a:solidFill>
@@ -11532,7 +11532,7 @@
               </a:ln>
               <a:extLst>
                 <a:ext uri="{91240B29-F687-4f45-9708-019B960494DF}">
-                  <a14:hiddenLine xmlns="" xmlns:a14="http://schemas.microsoft.com/office/drawing/2010/main" w="9525">
+                  <a14:hiddenLine xmlns:a14="http://schemas.microsoft.com/office/drawing/2010/main" xmlns="" w="9525">
                     <a:solidFill>
                       <a:srgbClr val="000000"/>
                     </a:solidFill>
@@ -11600,7 +11600,7 @@
               </a:ln>
               <a:extLst>
                 <a:ext uri="{91240B29-F687-4f45-9708-019B960494DF}">
-                  <a14:hiddenLine xmlns="" xmlns:a14="http://schemas.microsoft.com/office/drawing/2010/main" w="9525">
+                  <a14:hiddenLine xmlns:a14="http://schemas.microsoft.com/office/drawing/2010/main" xmlns="" w="9525">
                     <a:solidFill>
                       <a:srgbClr val="000000"/>
                     </a:solidFill>
@@ -11690,7 +11690,7 @@
               </a:ln>
               <a:extLst>
                 <a:ext uri="{91240B29-F687-4f45-9708-019B960494DF}">
-                  <a14:hiddenLine xmlns="" xmlns:a14="http://schemas.microsoft.com/office/drawing/2010/main" w="9525">
+                  <a14:hiddenLine xmlns:a14="http://schemas.microsoft.com/office/drawing/2010/main" xmlns="" w="9525">
                     <a:solidFill>
                       <a:srgbClr val="000000"/>
                     </a:solidFill>
@@ -11758,7 +11758,7 @@
               </a:ln>
               <a:extLst>
                 <a:ext uri="{91240B29-F687-4f45-9708-019B960494DF}">
-                  <a14:hiddenLine xmlns="" xmlns:a14="http://schemas.microsoft.com/office/drawing/2010/main" w="9525">
+                  <a14:hiddenLine xmlns:a14="http://schemas.microsoft.com/office/drawing/2010/main" xmlns="" w="9525">
                     <a:solidFill>
                       <a:srgbClr val="000000"/>
                     </a:solidFill>
@@ -11848,7 +11848,7 @@
               </a:ln>
               <a:extLst>
                 <a:ext uri="{91240B29-F687-4f45-9708-019B960494DF}">
-                  <a14:hiddenLine xmlns="" xmlns:a14="http://schemas.microsoft.com/office/drawing/2010/main" w="9525">
+                  <a14:hiddenLine xmlns:a14="http://schemas.microsoft.com/office/drawing/2010/main" xmlns="" w="9525">
                     <a:solidFill>
                       <a:srgbClr val="000000"/>
                     </a:solidFill>
@@ -11882,7 +11882,7 @@
               </a:ln>
               <a:extLst>
                 <a:ext uri="{91240B29-F687-4f45-9708-019B960494DF}">
-                  <a14:hiddenLine xmlns="" xmlns:a14="http://schemas.microsoft.com/office/drawing/2010/main" w="9525">
+                  <a14:hiddenLine xmlns:a14="http://schemas.microsoft.com/office/drawing/2010/main" xmlns="" w="9525">
                     <a:solidFill>
                       <a:srgbClr val="000000"/>
                     </a:solidFill>
@@ -12022,7 +12022,7 @@
           <a:p>
             <a:fld id="{AC1EE09D-E7E8-4C46-8584-2F5548DCD08C}" type="datetimeFigureOut">
               <a:rPr lang="en-GB" smtClean="0"/>
-              <a:t>19/03/2019</a:t>
+              <a:t>20/03/2019</a:t>
             </a:fld>
             <a:endParaRPr lang="en-GB"/>
           </a:p>
@@ -12797,11 +12797,8 @@
             </a:pPr>
             <a:r>
               <a:rPr lang="en-GB" dirty="0"/>
-              <a:t>Intrusion detection mechanisms and access control</a:t>
+              <a:t>Intrusion detection mechanism</a:t>
             </a:r>
-          </a:p>
-          <a:p>
-            <a:endParaRPr lang="en-GB" dirty="0"/>
           </a:p>
         </p:txBody>
       </p:sp>

</xml_diff>